<commit_message>
Fix OrdersResource GET response and update API description in slides
The GET route doesn't create anything, so make it return 200 OK instead of 201 Created.
</commit_message>
<xml_diff>
--- a/Task-3/TIES4560 Task 3.pptx
+++ b/Task-3/TIES4560 Task 3.pptx
@@ -107,7 +107,56 @@
       </a:defRPr>
     </a:lvl9pPr>
   </p:defaultTextStyle>
+  <p:extLst>
+    <p:ext uri="{EFAFB233-063F-42B5-8137-9DF3F51BA10A}">
+      <p15:sldGuideLst xmlns:p15="http://schemas.microsoft.com/office/powerpoint/2012/main"/>
+    </p:ext>
+  </p:extLst>
 </p:presentation>
+</file>
+
+<file path=ppt/changesInfos/changesInfo1.xml><?xml version="1.0" encoding="utf-8"?>
+<pc:chgInfo xmlns:a="http://schemas.openxmlformats.org/drawingml/2006/main" xmlns:r="http://schemas.openxmlformats.org/officeDocument/2006/relationships" xmlns:ac="http://schemas.microsoft.com/office/drawing/2013/main/command" xmlns:pc="http://schemas.microsoft.com/office/powerpoint/2013/main/command">
+  <pc:docChgLst>
+    <pc:chgData name="Rami Pasanen" userId="312aadca14e9d211" providerId="Windows Live" clId="Web-{17BAB2BD-7A54-488D-8370-1662618836FE}"/>
+    <pc:docChg chg="modSld">
+      <pc:chgData name="Rami Pasanen" userId="312aadca14e9d211" providerId="Windows Live" clId="Web-{17BAB2BD-7A54-488D-8370-1662618836FE}" dt="2018-09-26T13:36:23.133" v="51"/>
+      <pc:docMkLst>
+        <pc:docMk/>
+      </pc:docMkLst>
+      <pc:sldChg chg="modSp">
+        <pc:chgData name="Rami Pasanen" userId="312aadca14e9d211" providerId="Windows Live" clId="Web-{17BAB2BD-7A54-488D-8370-1662618836FE}" dt="2018-09-26T13:35:47.788" v="47"/>
+        <pc:sldMkLst>
+          <pc:docMk/>
+          <pc:sldMk cId="533445128" sldId="257"/>
+        </pc:sldMkLst>
+        <pc:graphicFrameChg chg="mod modGraphic">
+          <ac:chgData name="Rami Pasanen" userId="312aadca14e9d211" providerId="Windows Live" clId="Web-{17BAB2BD-7A54-488D-8370-1662618836FE}" dt="2018-09-26T13:35:47.788" v="47"/>
+          <ac:graphicFrameMkLst>
+            <pc:docMk/>
+            <pc:sldMk cId="533445128" sldId="257"/>
+            <ac:graphicFrameMk id="4" creationId="{ABE940A2-B3B7-4F7D-AD89-B4FE6925ADD8}"/>
+          </ac:graphicFrameMkLst>
+        </pc:graphicFrameChg>
+      </pc:sldChg>
+      <pc:sldChg chg="modSp">
+        <pc:chgData name="Rami Pasanen" userId="312aadca14e9d211" providerId="Windows Live" clId="Web-{17BAB2BD-7A54-488D-8370-1662618836FE}" dt="2018-09-26T13:36:23.133" v="51"/>
+        <pc:sldMkLst>
+          <pc:docMk/>
+          <pc:sldMk cId="3951625645" sldId="258"/>
+        </pc:sldMkLst>
+        <pc:graphicFrameChg chg="mod modGraphic">
+          <ac:chgData name="Rami Pasanen" userId="312aadca14e9d211" providerId="Windows Live" clId="Web-{17BAB2BD-7A54-488D-8370-1662618836FE}" dt="2018-09-26T13:36:23.133" v="51"/>
+          <ac:graphicFrameMkLst>
+            <pc:docMk/>
+            <pc:sldMk cId="3951625645" sldId="258"/>
+            <ac:graphicFrameMk id="4" creationId="{AF06E764-AC5C-4783-8998-C8897A52DE36}"/>
+          </ac:graphicFrameMkLst>
+        </pc:graphicFrameChg>
+      </pc:sldChg>
+    </pc:docChg>
+  </pc:docChgLst>
+</pc:chgInfo>
 </file>
 
 <file path=ppt/slideLayouts/slideLayout1.xml><?xml version="1.0" encoding="utf-8"?>
@@ -278,7 +327,7 @@
           <a:p>
             <a:fld id="{F0E324A0-8BFE-4AC2-B8AC-DA4EE1072CBD}" type="datetimeFigureOut">
               <a:rPr lang="fi-FI" smtClean="0"/>
-              <a:t>25.9.2018</a:t>
+              <a:t>26.9.2018</a:t>
             </a:fld>
             <a:endParaRPr lang="fi-FI"/>
           </a:p>
@@ -506,7 +555,7 @@
           <a:p>
             <a:fld id="{F0E324A0-8BFE-4AC2-B8AC-DA4EE1072CBD}" type="datetimeFigureOut">
               <a:rPr lang="fi-FI" smtClean="0"/>
-              <a:t>25.9.2018</a:t>
+              <a:t>26.9.2018</a:t>
             </a:fld>
             <a:endParaRPr lang="fi-FI"/>
           </a:p>
@@ -686,7 +735,7 @@
           <a:p>
             <a:fld id="{F0E324A0-8BFE-4AC2-B8AC-DA4EE1072CBD}" type="datetimeFigureOut">
               <a:rPr lang="fi-FI" smtClean="0"/>
-              <a:t>25.9.2018</a:t>
+              <a:t>26.9.2018</a:t>
             </a:fld>
             <a:endParaRPr lang="fi-FI"/>
           </a:p>
@@ -856,7 +905,7 @@
           <a:p>
             <a:fld id="{F0E324A0-8BFE-4AC2-B8AC-DA4EE1072CBD}" type="datetimeFigureOut">
               <a:rPr lang="fi-FI" smtClean="0"/>
-              <a:t>25.9.2018</a:t>
+              <a:t>26.9.2018</a:t>
             </a:fld>
             <a:endParaRPr lang="fi-FI"/>
           </a:p>
@@ -1110,7 +1159,7 @@
           <a:p>
             <a:fld id="{F0E324A0-8BFE-4AC2-B8AC-DA4EE1072CBD}" type="datetimeFigureOut">
               <a:rPr lang="fi-FI" smtClean="0"/>
-              <a:t>25.9.2018</a:t>
+              <a:t>26.9.2018</a:t>
             </a:fld>
             <a:endParaRPr lang="fi-FI"/>
           </a:p>
@@ -1436,7 +1485,7 @@
           <a:p>
             <a:fld id="{F0E324A0-8BFE-4AC2-B8AC-DA4EE1072CBD}" type="datetimeFigureOut">
               <a:rPr lang="fi-FI" smtClean="0"/>
-              <a:t>25.9.2018</a:t>
+              <a:t>26.9.2018</a:t>
             </a:fld>
             <a:endParaRPr lang="fi-FI"/>
           </a:p>
@@ -1887,7 +1936,7 @@
           <a:p>
             <a:fld id="{F0E324A0-8BFE-4AC2-B8AC-DA4EE1072CBD}" type="datetimeFigureOut">
               <a:rPr lang="fi-FI" smtClean="0"/>
-              <a:t>25.9.2018</a:t>
+              <a:t>26.9.2018</a:t>
             </a:fld>
             <a:endParaRPr lang="fi-FI"/>
           </a:p>
@@ -2005,7 +2054,7 @@
           <a:p>
             <a:fld id="{F0E324A0-8BFE-4AC2-B8AC-DA4EE1072CBD}" type="datetimeFigureOut">
               <a:rPr lang="fi-FI" smtClean="0"/>
-              <a:t>25.9.2018</a:t>
+              <a:t>26.9.2018</a:t>
             </a:fld>
             <a:endParaRPr lang="fi-FI"/>
           </a:p>
@@ -2100,7 +2149,7 @@
           <a:p>
             <a:fld id="{F0E324A0-8BFE-4AC2-B8AC-DA4EE1072CBD}" type="datetimeFigureOut">
               <a:rPr lang="fi-FI" smtClean="0"/>
-              <a:t>25.9.2018</a:t>
+              <a:t>26.9.2018</a:t>
             </a:fld>
             <a:endParaRPr lang="fi-FI"/>
           </a:p>
@@ -2387,7 +2436,7 @@
           <a:p>
             <a:fld id="{F0E324A0-8BFE-4AC2-B8AC-DA4EE1072CBD}" type="datetimeFigureOut">
               <a:rPr lang="fi-FI" smtClean="0"/>
-              <a:t>25.9.2018</a:t>
+              <a:t>26.9.2018</a:t>
             </a:fld>
             <a:endParaRPr lang="fi-FI"/>
           </a:p>
@@ -2712,7 +2761,7 @@
           <a:p>
             <a:fld id="{F0E324A0-8BFE-4AC2-B8AC-DA4EE1072CBD}" type="datetimeFigureOut">
               <a:rPr lang="fi-FI" smtClean="0"/>
-              <a:t>25.9.2018</a:t>
+              <a:t>26.9.2018</a:t>
             </a:fld>
             <a:endParaRPr lang="fi-FI"/>
           </a:p>
@@ -2966,7 +3015,7 @@
           <a:p>
             <a:fld id="{F0E324A0-8BFE-4AC2-B8AC-DA4EE1072CBD}" type="datetimeFigureOut">
               <a:rPr lang="fi-FI" smtClean="0"/>
-              <a:t>25.9.2018</a:t>
+              <a:t>26.9.2018</a:t>
             </a:fld>
             <a:endParaRPr lang="fi-FI"/>
           </a:p>
@@ -3879,7 +3928,7 @@
             <p:ph idx="1"/>
             <p:extLst>
               <p:ext uri="{D42A27DB-BD31-4B8C-83A1-F6EECF244321}">
-                <p14:modId xmlns:p14="http://schemas.microsoft.com/office/powerpoint/2010/main" val="3888145288"/>
+                <p14:modId xmlns:p14="http://schemas.microsoft.com/office/powerpoint/2010/main" val="756061254"/>
               </p:ext>
             </p:extLst>
           </p:nvPr>
@@ -3944,6 +3993,9 @@
                     <a:bodyPr/>
                     <a:lstStyle/>
                     <a:p>
+                      <a:pPr>
+                        <a:buNone/>
+                      </a:pPr>
                       <a:r>
                         <a:rPr lang="fi-FI" dirty="0" err="1"/>
                         <a:t>Path</a:t>
@@ -4106,15 +4158,13 @@
                     <a:bodyPr/>
                     <a:lstStyle/>
                     <a:p>
+                      <a:pPr>
+                        <a:buNone/>
+                      </a:pPr>
                       <a:r>
                         <a:rPr lang="fi-FI" dirty="0"/>
-                        <a:t>201 </a:t>
-                      </a:r>
-                      <a:r>
-                        <a:rPr lang="fi-FI" dirty="0" err="1"/>
-                        <a:t>Created</a:t>
-                      </a:r>
-                      <a:endParaRPr lang="fi-FI" dirty="0"/>
+                        <a:t>200 OK</a:t>
+                      </a:r>
                     </a:p>
                   </a:txBody>
                   <a:tcPr/>
@@ -4124,7 +4174,25 @@
                     <a:bodyPr/>
                     <a:lstStyle/>
                     <a:p>
-                      <a:endParaRPr lang="fi-FI"/>
+                      <a:pPr>
+                        <a:buNone/>
+                      </a:pPr>
+                      <a:r>
+                        <a:rPr lang="fi-FI" dirty="0"/>
+                        <a:t>404 </a:t>
+                      </a:r>
+                      <a:r>
+                        <a:rPr lang="fi-FI" dirty="0" err="1"/>
+                        <a:t>Not</a:t>
+                      </a:r>
+                      <a:r>
+                        <a:rPr lang="fi-FI" dirty="0"/>
+                        <a:t> </a:t>
+                      </a:r>
+                      <a:r>
+                        <a:rPr lang="fi-FI" dirty="0" err="1"/>
+                        <a:t>found</a:t>
+                      </a:r>
                     </a:p>
                   </a:txBody>
                   <a:tcPr/>
@@ -4151,6 +4219,9 @@
                     <a:bodyPr/>
                     <a:lstStyle/>
                     <a:p>
+                      <a:pPr>
+                        <a:buNone/>
+                      </a:pPr>
                       <a:r>
                         <a:rPr lang="fi-FI" dirty="0"/>
                         <a:t>/</a:t>
@@ -4195,9 +4266,16 @@
                     <a:bodyPr/>
                     <a:lstStyle/>
                     <a:p>
+                      <a:pPr>
+                        <a:buNone/>
+                      </a:pPr>
                       <a:r>
                         <a:rPr lang="fi-FI" dirty="0"/>
-                        <a:t>200 OK</a:t>
+                        <a:t>201 </a:t>
+                      </a:r>
+                      <a:r>
+                        <a:rPr lang="fi-FI" dirty="0" err="1"/>
+                        <a:t>Created</a:t>
                       </a:r>
                     </a:p>
                   </a:txBody>
@@ -4235,12 +4313,15 @@
                     <a:bodyPr/>
                     <a:lstStyle/>
                     <a:p>
+                      <a:pPr>
+                        <a:buNone/>
+                      </a:pPr>
                       <a:r>
                         <a:rPr lang="fi-FI" dirty="0"/>
                         <a:t>/</a:t>
                       </a:r>
                       <a:r>
-                        <a:rPr lang="fi-FI" dirty="0" err="1"/>
+                        <a:rPr lang="fi-FI" err="1"/>
                         <a:t>orders</a:t>
                       </a:r>
                       <a:r>
@@ -4248,7 +4329,7 @@
                         <a:t>/{</a:t>
                       </a:r>
                       <a:r>
-                        <a:rPr lang="fi-FI" dirty="0" err="1"/>
+                        <a:rPr lang="fi-FI" err="1"/>
                         <a:t>orderId</a:t>
                       </a:r>
                       <a:r>
@@ -4277,11 +4358,14 @@
                     <a:bodyPr/>
                     <a:lstStyle/>
                     <a:p>
-                      <a:r>
-                        <a:rPr lang="fi-FI" dirty="0" err="1"/>
+                      <a:pPr>
+                        <a:buNone/>
+                      </a:pPr>
+                      <a:r>
+                        <a:rPr lang="fi-FI" err="1"/>
                         <a:t>orderId</a:t>
                       </a:r>
-                      <a:endParaRPr lang="fi-FI" dirty="0"/>
+                      <a:endParaRPr lang="fi-FI"/>
                     </a:p>
                   </a:txBody>
                   <a:tcPr/>
@@ -4304,7 +4388,25 @@
                     <a:bodyPr/>
                     <a:lstStyle/>
                     <a:p>
-                      <a:endParaRPr lang="fi-FI"/>
+                      <a:pPr>
+                        <a:buNone/>
+                      </a:pPr>
+                      <a:r>
+                        <a:rPr lang="fi-FI" dirty="0"/>
+                        <a:t>404 </a:t>
+                      </a:r>
+                      <a:r>
+                        <a:rPr lang="fi-FI" dirty="0" err="1"/>
+                        <a:t>Not</a:t>
+                      </a:r>
+                      <a:r>
+                        <a:rPr lang="fi-FI" dirty="0"/>
+                        <a:t> </a:t>
+                      </a:r>
+                      <a:r>
+                        <a:rPr lang="fi-FI" dirty="0" err="1"/>
+                        <a:t>found</a:t>
+                      </a:r>
                     </a:p>
                   </a:txBody>
                   <a:tcPr/>
@@ -4331,6 +4433,9 @@
                     <a:bodyPr/>
                     <a:lstStyle/>
                     <a:p>
+                      <a:pPr>
+                        <a:buNone/>
+                      </a:pPr>
                       <a:r>
                         <a:rPr lang="fi-FI" dirty="0"/>
                         <a:t>/</a:t>
@@ -4343,31 +4448,32 @@
                         <a:rPr lang="fi-FI" dirty="0"/>
                         <a:t>/</a:t>
                       </a:r>
-                    </a:p>
-                  </a:txBody>
-                  <a:tcPr/>
-                </a:tc>
-                <a:tc>
-                  <a:txBody>
-                    <a:bodyPr/>
-                    <a:lstStyle/>
-                    <a:p>
-                      <a:r>
-                        <a:rPr lang="fi-FI" dirty="0"/>
-                        <a:t>DELETE</a:t>
-                      </a:r>
-                    </a:p>
-                  </a:txBody>
-                  <a:tcPr/>
-                </a:tc>
-                <a:tc>
-                  <a:txBody>
-                    <a:bodyPr/>
-                    <a:lstStyle/>
-                    <a:p>
-                      <a:r>
-                        <a:rPr lang="fi-FI" dirty="0" err="1"/>
+                      <a:r>
+                        <a:rPr lang="fi-FI" sz="1800" b="0" i="0" u="none" strike="noStrike" noProof="0" dirty="0">
+                          <a:solidFill>
+                            <a:srgbClr val="000000"/>
+                          </a:solidFill>
+                          <a:latin typeface="Century Schoolbook"/>
+                        </a:rPr>
+                        <a:t>{</a:t>
+                      </a:r>
+                      <a:r>
+                        <a:rPr lang="fi-FI" sz="1800" b="0" i="0" u="none" strike="noStrike" noProof="0" dirty="0" err="1">
+                          <a:solidFill>
+                            <a:srgbClr val="000000"/>
+                          </a:solidFill>
+                          <a:latin typeface="Century Schoolbook"/>
+                        </a:rPr>
                         <a:t>orderId</a:t>
+                      </a:r>
+                      <a:r>
+                        <a:rPr lang="fi-FI" sz="1800" b="0" i="0" u="none" strike="noStrike" noProof="0" dirty="0">
+                          <a:solidFill>
+                            <a:srgbClr val="000000"/>
+                          </a:solidFill>
+                          <a:latin typeface="Century Schoolbook"/>
+                        </a:rPr>
+                        <a:t>}</a:t>
                       </a:r>
                       <a:endParaRPr lang="fi-FI" dirty="0"/>
                     </a:p>
@@ -4381,7 +4487,7 @@
                     <a:p>
                       <a:r>
                         <a:rPr lang="fi-FI" dirty="0"/>
-                        <a:t>200 OK</a:t>
+                        <a:t>DELETE</a:t>
                       </a:r>
                     </a:p>
                   </a:txBody>
@@ -4392,12 +4498,45 @@
                     <a:bodyPr/>
                     <a:lstStyle/>
                     <a:p>
+                      <a:pPr>
+                        <a:buNone/>
+                      </a:pPr>
+                      <a:r>
+                        <a:rPr lang="fi-FI" err="1"/>
+                        <a:t>orderId</a:t>
+                      </a:r>
+                      <a:endParaRPr lang="fi-FI"/>
+                    </a:p>
+                  </a:txBody>
+                  <a:tcPr/>
+                </a:tc>
+                <a:tc>
+                  <a:txBody>
+                    <a:bodyPr/>
+                    <a:lstStyle/>
+                    <a:p>
+                      <a:r>
+                        <a:rPr lang="fi-FI" dirty="0"/>
+                        <a:t>200 OK</a:t>
+                      </a:r>
+                    </a:p>
+                  </a:txBody>
+                  <a:tcPr/>
+                </a:tc>
+                <a:tc>
+                  <a:txBody>
+                    <a:bodyPr/>
+                    <a:lstStyle/>
+                    <a:p>
+                      <a:pPr>
+                        <a:buNone/>
+                      </a:pPr>
                       <a:r>
                         <a:rPr lang="fi-FI" dirty="0"/>
                         <a:t>404 </a:t>
                       </a:r>
                       <a:r>
-                        <a:rPr lang="fi-FI" dirty="0" err="1"/>
+                        <a:rPr lang="fi-FI" err="1"/>
                         <a:t>Not</a:t>
                       </a:r>
                       <a:r>
@@ -4405,10 +4544,10 @@
                         <a:t> </a:t>
                       </a:r>
                       <a:r>
-                        <a:rPr lang="fi-FI" dirty="0" err="1"/>
+                        <a:rPr lang="fi-FI" err="1"/>
                         <a:t>found</a:t>
                       </a:r>
-                      <a:endParaRPr lang="fi-FI" dirty="0"/>
+                      <a:endParaRPr lang="fi-FI"/>
                     </a:p>
                   </a:txBody>
                   <a:tcPr/>
@@ -4507,7 +4646,7 @@
             <p:ph idx="1"/>
             <p:extLst>
               <p:ext uri="{D42A27DB-BD31-4B8C-83A1-F6EECF244321}">
-                <p14:modId xmlns:p14="http://schemas.microsoft.com/office/powerpoint/2010/main" val="2046637868"/>
+                <p14:modId xmlns:p14="http://schemas.microsoft.com/office/powerpoint/2010/main" val="2419542978"/>
               </p:ext>
             </p:extLst>
           </p:nvPr>
@@ -4572,6 +4711,9 @@
                     <a:bodyPr/>
                     <a:lstStyle/>
                     <a:p>
+                      <a:pPr>
+                        <a:buNone/>
+                      </a:pPr>
                       <a:r>
                         <a:rPr lang="fi-FI" dirty="0" err="1"/>
                         <a:t>Path</a:t>
@@ -4704,9 +4846,12 @@
                     <a:bodyPr/>
                     <a:lstStyle/>
                     <a:p>
-                      <a:r>
-                        <a:rPr lang="fi-FI" dirty="0" err="1"/>
-                        <a:t>Category</a:t>
+                      <a:pPr>
+                        <a:buNone/>
+                      </a:pPr>
+                      <a:r>
+                        <a:rPr lang="fi-FI"/>
+                        <a:t>category</a:t>
                       </a:r>
                       <a:endParaRPr lang="fi-FI" dirty="0"/>
                     </a:p>
@@ -4758,6 +4903,9 @@
                     <a:bodyPr/>
                     <a:lstStyle/>
                     <a:p>
+                      <a:pPr>
+                        <a:buNone/>
+                      </a:pPr>
                       <a:r>
                         <a:rPr lang="fi-FI" dirty="0"/>
                         <a:t>/products/{</a:t>
@@ -4792,11 +4940,14 @@
                     <a:bodyPr/>
                     <a:lstStyle/>
                     <a:p>
-                      <a:r>
-                        <a:rPr lang="fi-FI" dirty="0" err="1"/>
+                      <a:pPr>
+                        <a:buNone/>
+                      </a:pPr>
+                      <a:r>
+                        <a:rPr lang="fi-FI" err="1"/>
                         <a:t>productId</a:t>
                       </a:r>
-                      <a:endParaRPr lang="fi-FI" dirty="0"/>
+                      <a:endParaRPr lang="fi-FI"/>
                     </a:p>
                   </a:txBody>
                   <a:tcPr/>
@@ -4819,12 +4970,15 @@
                     <a:bodyPr/>
                     <a:lstStyle/>
                     <a:p>
+                      <a:pPr>
+                        <a:buNone/>
+                      </a:pPr>
                       <a:r>
                         <a:rPr lang="fi-FI" dirty="0"/>
                         <a:t>404 </a:t>
                       </a:r>
                       <a:r>
-                        <a:rPr lang="fi-FI" dirty="0" err="1"/>
+                        <a:rPr lang="fi-FI" err="1"/>
                         <a:t>Not</a:t>
                       </a:r>
                       <a:r>
@@ -4832,10 +4986,10 @@
                         <a:t> </a:t>
                       </a:r>
                       <a:r>
-                        <a:rPr lang="fi-FI" dirty="0" err="1"/>
+                        <a:rPr lang="fi-FI" err="1"/>
                         <a:t>found</a:t>
                       </a:r>
-                      <a:endParaRPr lang="fi-FI" dirty="0"/>
+                      <a:endParaRPr lang="fi-FI"/>
                     </a:p>
                   </a:txBody>
                   <a:tcPr/>
@@ -4898,15 +5052,18 @@
                     <a:bodyPr/>
                     <a:lstStyle/>
                     <a:p>
+                      <a:pPr>
+                        <a:buNone/>
+                      </a:pPr>
                       <a:r>
                         <a:rPr lang="fi-FI" dirty="0"/>
                         <a:t>201 </a:t>
                       </a:r>
                       <a:r>
-                        <a:rPr lang="fi-FI" dirty="0" err="1"/>
+                        <a:rPr lang="fi-FI" err="1"/>
                         <a:t>Created</a:t>
                       </a:r>
-                      <a:endParaRPr lang="fi-FI" dirty="0"/>
+                      <a:endParaRPr lang="fi-FI"/>
                     </a:p>
                   </a:txBody>
                   <a:tcPr/>

</xml_diff>